<commit_message>
return screenshots to Git repo
</commit_message>
<xml_diff>
--- a/Screenshots/Screenshots.pptx
+++ b/Screenshots/Screenshots.pptx
@@ -15,6 +15,22 @@
     <p:sldId id="263" r:id="rId9"/>
     <p:sldId id="264" r:id="rId10"/>
     <p:sldId id="265" r:id="rId11"/>
+    <p:sldId id="266" r:id="rId12"/>
+    <p:sldId id="267" r:id="rId13"/>
+    <p:sldId id="268" r:id="rId14"/>
+    <p:sldId id="269" r:id="rId15"/>
+    <p:sldId id="270" r:id="rId16"/>
+    <p:sldId id="271" r:id="rId17"/>
+    <p:sldId id="272" r:id="rId18"/>
+    <p:sldId id="273" r:id="rId19"/>
+    <p:sldId id="274" r:id="rId20"/>
+    <p:sldId id="275" r:id="rId21"/>
+    <p:sldId id="276" r:id="rId22"/>
+    <p:sldId id="277" r:id="rId23"/>
+    <p:sldId id="278" r:id="rId24"/>
+    <p:sldId id="279" r:id="rId25"/>
+    <p:sldId id="280" r:id="rId26"/>
+    <p:sldId id="281" r:id="rId27"/>
   </p:sldIdLst>
   <p:sldSz cx="12192000" cy="6858000"/>
   <p:notesSz cx="6858000" cy="9144000"/>
@@ -268,7 +284,7 @@
           <a:p>
             <a:fld id="{DE007FD2-96EB-E24F-BA3E-0A4621FA949E}" type="datetimeFigureOut">
               <a:rPr lang="en-US" smtClean="0"/>
-              <a:t>4/8/25</a:t>
+              <a:t>4/15/25</a:t>
             </a:fld>
             <a:endParaRPr lang="en-US"/>
           </a:p>
@@ -466,7 +482,7 @@
           <a:p>
             <a:fld id="{DE007FD2-96EB-E24F-BA3E-0A4621FA949E}" type="datetimeFigureOut">
               <a:rPr lang="en-US" smtClean="0"/>
-              <a:t>4/8/25</a:t>
+              <a:t>4/15/25</a:t>
             </a:fld>
             <a:endParaRPr lang="en-US"/>
           </a:p>
@@ -674,7 +690,7 @@
           <a:p>
             <a:fld id="{DE007FD2-96EB-E24F-BA3E-0A4621FA949E}" type="datetimeFigureOut">
               <a:rPr lang="en-US" smtClean="0"/>
-              <a:t>4/8/25</a:t>
+              <a:t>4/15/25</a:t>
             </a:fld>
             <a:endParaRPr lang="en-US"/>
           </a:p>
@@ -872,7 +888,7 @@
           <a:p>
             <a:fld id="{DE007FD2-96EB-E24F-BA3E-0A4621FA949E}" type="datetimeFigureOut">
               <a:rPr lang="en-US" smtClean="0"/>
-              <a:t>4/8/25</a:t>
+              <a:t>4/15/25</a:t>
             </a:fld>
             <a:endParaRPr lang="en-US"/>
           </a:p>
@@ -1147,7 +1163,7 @@
           <a:p>
             <a:fld id="{DE007FD2-96EB-E24F-BA3E-0A4621FA949E}" type="datetimeFigureOut">
               <a:rPr lang="en-US" smtClean="0"/>
-              <a:t>4/8/25</a:t>
+              <a:t>4/15/25</a:t>
             </a:fld>
             <a:endParaRPr lang="en-US"/>
           </a:p>
@@ -1412,7 +1428,7 @@
           <a:p>
             <a:fld id="{DE007FD2-96EB-E24F-BA3E-0A4621FA949E}" type="datetimeFigureOut">
               <a:rPr lang="en-US" smtClean="0"/>
-              <a:t>4/8/25</a:t>
+              <a:t>4/15/25</a:t>
             </a:fld>
             <a:endParaRPr lang="en-US"/>
           </a:p>
@@ -1824,7 +1840,7 @@
           <a:p>
             <a:fld id="{DE007FD2-96EB-E24F-BA3E-0A4621FA949E}" type="datetimeFigureOut">
               <a:rPr lang="en-US" smtClean="0"/>
-              <a:t>4/8/25</a:t>
+              <a:t>4/15/25</a:t>
             </a:fld>
             <a:endParaRPr lang="en-US"/>
           </a:p>
@@ -1965,7 +1981,7 @@
           <a:p>
             <a:fld id="{DE007FD2-96EB-E24F-BA3E-0A4621FA949E}" type="datetimeFigureOut">
               <a:rPr lang="en-US" smtClean="0"/>
-              <a:t>4/8/25</a:t>
+              <a:t>4/15/25</a:t>
             </a:fld>
             <a:endParaRPr lang="en-US"/>
           </a:p>
@@ -2078,7 +2094,7 @@
           <a:p>
             <a:fld id="{DE007FD2-96EB-E24F-BA3E-0A4621FA949E}" type="datetimeFigureOut">
               <a:rPr lang="en-US" smtClean="0"/>
-              <a:t>4/8/25</a:t>
+              <a:t>4/15/25</a:t>
             </a:fld>
             <a:endParaRPr lang="en-US"/>
           </a:p>
@@ -2389,7 +2405,7 @@
           <a:p>
             <a:fld id="{DE007FD2-96EB-E24F-BA3E-0A4621FA949E}" type="datetimeFigureOut">
               <a:rPr lang="en-US" smtClean="0"/>
-              <a:t>4/8/25</a:t>
+              <a:t>4/15/25</a:t>
             </a:fld>
             <a:endParaRPr lang="en-US"/>
           </a:p>
@@ -2677,7 +2693,7 @@
           <a:p>
             <a:fld id="{DE007FD2-96EB-E24F-BA3E-0A4621FA949E}" type="datetimeFigureOut">
               <a:rPr lang="en-US" smtClean="0"/>
-              <a:t>4/8/25</a:t>
+              <a:t>4/15/25</a:t>
             </a:fld>
             <a:endParaRPr lang="en-US"/>
           </a:p>
@@ -2918,7 +2934,7 @@
           <a:p>
             <a:fld id="{DE007FD2-96EB-E24F-BA3E-0A4621FA949E}" type="datetimeFigureOut">
               <a:rPr lang="en-US" smtClean="0"/>
-              <a:t>4/8/25</a:t>
+              <a:t>4/15/25</a:t>
             </a:fld>
             <a:endParaRPr lang="en-US"/>
           </a:p>
@@ -3443,10 +3459,1054 @@
           <a:chExt cx="0" cy="0"/>
         </a:xfrm>
       </p:grpSpPr>
+      <p:pic>
+        <p:nvPicPr>
+          <p:cNvPr id="2" name="Picture 1">
+            <a:extLst>
+              <a:ext uri="{FF2B5EF4-FFF2-40B4-BE49-F238E27FC236}">
+                <a16:creationId xmlns:a16="http://schemas.microsoft.com/office/drawing/2014/main" id="{155E8A3C-EF7D-E183-2677-B34ED7EB684B}"/>
+              </a:ext>
+            </a:extLst>
+          </p:cNvPr>
+          <p:cNvPicPr>
+            <a:picLocks noChangeAspect="1"/>
+          </p:cNvPicPr>
+          <p:nvPr/>
+        </p:nvPicPr>
+        <p:blipFill>
+          <a:blip r:embed="rId2"/>
+          <a:stretch>
+            <a:fillRect/>
+          </a:stretch>
+        </p:blipFill>
+        <p:spPr>
+          <a:xfrm>
+            <a:off x="1989083" y="699774"/>
+            <a:ext cx="7772400" cy="3062091"/>
+          </a:xfrm>
+          <a:prstGeom prst="rect">
+            <a:avLst/>
+          </a:prstGeom>
+        </p:spPr>
+      </p:pic>
+      <p:sp>
+        <p:nvSpPr>
+          <p:cNvPr id="4" name="TextBox 3">
+            <a:extLst>
+              <a:ext uri="{FF2B5EF4-FFF2-40B4-BE49-F238E27FC236}">
+                <a16:creationId xmlns:a16="http://schemas.microsoft.com/office/drawing/2014/main" id="{DA064CA7-A0CB-D361-D041-0B336B4C3B15}"/>
+              </a:ext>
+            </a:extLst>
+          </p:cNvPr>
+          <p:cNvSpPr txBox="1"/>
+          <p:nvPr/>
+        </p:nvSpPr>
+        <p:spPr>
+          <a:xfrm>
+            <a:off x="3132083" y="4676368"/>
+            <a:ext cx="6096000" cy="369332"/>
+          </a:xfrm>
+          <a:prstGeom prst="rect">
+            <a:avLst/>
+          </a:prstGeom>
+          <a:noFill/>
+        </p:spPr>
+        <p:txBody>
+          <a:bodyPr wrap="square">
+            <a:spAutoFit/>
+          </a:bodyPr>
+          <a:lstStyle/>
+          <a:p>
+            <a:r>
+              <a:rPr lang="en-US" b="0" i="0" dirty="0" err="1">
+                <a:solidFill>
+                  <a:srgbClr val="D63384"/>
+                </a:solidFill>
+                <a:effectLst/>
+                <a:latin typeface="Consolas" panose="020B0609020204030204" pitchFamily="49" charset="0"/>
+              </a:rPr>
+              <a:t>dealer_details</a:t>
+            </a:r>
+            <a:endParaRPr lang="en-US" dirty="0"/>
+          </a:p>
+        </p:txBody>
+      </p:sp>
     </p:spTree>
     <p:extLst>
       <p:ext uri="{BB962C8B-B14F-4D97-AF65-F5344CB8AC3E}">
         <p14:creationId xmlns:p14="http://schemas.microsoft.com/office/powerpoint/2010/main" val="2533311792"/>
+      </p:ext>
+    </p:extLst>
+  </p:cSld>
+  <p:clrMapOvr>
+    <a:masterClrMapping/>
+  </p:clrMapOvr>
+</p:sld>
+</file>
+
+<file path=ppt/slides/slide11.xml><?xml version="1.0" encoding="utf-8"?>
+<p:sld xmlns:a="http://schemas.openxmlformats.org/drawingml/2006/main" xmlns:r="http://schemas.openxmlformats.org/officeDocument/2006/relationships" xmlns:p="http://schemas.openxmlformats.org/presentationml/2006/main">
+  <p:cSld>
+    <p:spTree>
+      <p:nvGrpSpPr>
+        <p:cNvPr id="1" name="">
+          <a:extLst>
+            <a:ext uri="{FF2B5EF4-FFF2-40B4-BE49-F238E27FC236}">
+              <a16:creationId xmlns:a16="http://schemas.microsoft.com/office/drawing/2014/main" id="{0CE0DD00-25F2-1EA3-3A30-B28927921466}"/>
+            </a:ext>
+          </a:extLst>
+        </p:cNvPr>
+        <p:cNvGrpSpPr/>
+        <p:nvPr/>
+      </p:nvGrpSpPr>
+      <p:grpSpPr>
+        <a:xfrm>
+          <a:off x="0" y="0"/>
+          <a:ext cx="0" cy="0"/>
+          <a:chOff x="0" y="0"/>
+          <a:chExt cx="0" cy="0"/>
+        </a:xfrm>
+      </p:grpSpPr>
+      <p:pic>
+        <p:nvPicPr>
+          <p:cNvPr id="3" name="Picture 2">
+            <a:extLst>
+              <a:ext uri="{FF2B5EF4-FFF2-40B4-BE49-F238E27FC236}">
+                <a16:creationId xmlns:a16="http://schemas.microsoft.com/office/drawing/2014/main" id="{87CAB267-BAC3-E676-6942-E0AF4C9214C6}"/>
+              </a:ext>
+            </a:extLst>
+          </p:cNvPr>
+          <p:cNvPicPr>
+            <a:picLocks noChangeAspect="1"/>
+          </p:cNvPicPr>
+          <p:nvPr/>
+        </p:nvPicPr>
+        <p:blipFill>
+          <a:blip r:embed="rId2"/>
+          <a:stretch>
+            <a:fillRect/>
+          </a:stretch>
+        </p:blipFill>
+        <p:spPr>
+          <a:xfrm>
+            <a:off x="2209800" y="820991"/>
+            <a:ext cx="7772400" cy="2967088"/>
+          </a:xfrm>
+          <a:prstGeom prst="rect">
+            <a:avLst/>
+          </a:prstGeom>
+        </p:spPr>
+      </p:pic>
+      <p:sp>
+        <p:nvSpPr>
+          <p:cNvPr id="5" name="TextBox 4">
+            <a:extLst>
+              <a:ext uri="{FF2B5EF4-FFF2-40B4-BE49-F238E27FC236}">
+                <a16:creationId xmlns:a16="http://schemas.microsoft.com/office/drawing/2014/main" id="{D246BA7D-E3A3-1B80-7ECE-CDF7A0A8231F}"/>
+              </a:ext>
+            </a:extLst>
+          </p:cNvPr>
+          <p:cNvSpPr txBox="1"/>
+          <p:nvPr/>
+        </p:nvSpPr>
+        <p:spPr>
+          <a:xfrm>
+            <a:off x="3658630" y="5199258"/>
+            <a:ext cx="6098058" cy="369332"/>
+          </a:xfrm>
+          <a:prstGeom prst="rect">
+            <a:avLst/>
+          </a:prstGeom>
+          <a:noFill/>
+        </p:spPr>
+        <p:txBody>
+          <a:bodyPr wrap="square">
+            <a:spAutoFit/>
+          </a:bodyPr>
+          <a:lstStyle/>
+          <a:p>
+            <a:r>
+              <a:rPr lang="en-US" b="0" i="0" dirty="0" err="1">
+                <a:solidFill>
+                  <a:srgbClr val="D63384"/>
+                </a:solidFill>
+                <a:effectLst/>
+                <a:latin typeface="Consolas" panose="020B0609020204030204" pitchFamily="49" charset="0"/>
+              </a:rPr>
+              <a:t>kansasDealers</a:t>
+            </a:r>
+            <a:endParaRPr lang="en-US" dirty="0"/>
+          </a:p>
+        </p:txBody>
+      </p:sp>
+    </p:spTree>
+    <p:extLst>
+      <p:ext uri="{BB962C8B-B14F-4D97-AF65-F5344CB8AC3E}">
+        <p14:creationId xmlns:p14="http://schemas.microsoft.com/office/powerpoint/2010/main" val="1533539999"/>
+      </p:ext>
+    </p:extLst>
+  </p:cSld>
+  <p:clrMapOvr>
+    <a:masterClrMapping/>
+  </p:clrMapOvr>
+</p:sld>
+</file>
+
+<file path=ppt/slides/slide12.xml><?xml version="1.0" encoding="utf-8"?>
+<p:sld xmlns:a="http://schemas.openxmlformats.org/drawingml/2006/main" xmlns:r="http://schemas.openxmlformats.org/officeDocument/2006/relationships" xmlns:p="http://schemas.openxmlformats.org/presentationml/2006/main">
+  <p:cSld>
+    <p:spTree>
+      <p:nvGrpSpPr>
+        <p:cNvPr id="1" name="">
+          <a:extLst>
+            <a:ext uri="{FF2B5EF4-FFF2-40B4-BE49-F238E27FC236}">
+              <a16:creationId xmlns:a16="http://schemas.microsoft.com/office/drawing/2014/main" id="{FD6C5EDB-7E0C-D803-E8B0-3A73739E3BD4}"/>
+            </a:ext>
+          </a:extLst>
+        </p:cNvPr>
+        <p:cNvGrpSpPr/>
+        <p:nvPr/>
+      </p:nvGrpSpPr>
+      <p:grpSpPr>
+        <a:xfrm>
+          <a:off x="0" y="0"/>
+          <a:ext cx="0" cy="0"/>
+          <a:chOff x="0" y="0"/>
+          <a:chExt cx="0" cy="0"/>
+        </a:xfrm>
+      </p:grpSpPr>
+      <p:pic>
+        <p:nvPicPr>
+          <p:cNvPr id="2" name="Picture 1">
+            <a:extLst>
+              <a:ext uri="{FF2B5EF4-FFF2-40B4-BE49-F238E27FC236}">
+                <a16:creationId xmlns:a16="http://schemas.microsoft.com/office/drawing/2014/main" id="{03731720-936D-9059-A26D-872E59369A47}"/>
+              </a:ext>
+            </a:extLst>
+          </p:cNvPr>
+          <p:cNvPicPr>
+            <a:picLocks noChangeAspect="1"/>
+          </p:cNvPicPr>
+          <p:nvPr/>
+        </p:nvPicPr>
+        <p:blipFill>
+          <a:blip r:embed="rId2"/>
+          <a:stretch>
+            <a:fillRect/>
+          </a:stretch>
+        </p:blipFill>
+        <p:spPr>
+          <a:xfrm>
+            <a:off x="1774396" y="1894703"/>
+            <a:ext cx="6616700" cy="2895600"/>
+          </a:xfrm>
+          <a:prstGeom prst="rect">
+            <a:avLst/>
+          </a:prstGeom>
+        </p:spPr>
+      </p:pic>
+      <p:sp>
+        <p:nvSpPr>
+          <p:cNvPr id="4" name="TextBox 3">
+            <a:extLst>
+              <a:ext uri="{FF2B5EF4-FFF2-40B4-BE49-F238E27FC236}">
+                <a16:creationId xmlns:a16="http://schemas.microsoft.com/office/drawing/2014/main" id="{7FEC0E2B-AFA5-4947-4223-1F0EA1586143}"/>
+              </a:ext>
+            </a:extLst>
+          </p:cNvPr>
+          <p:cNvSpPr txBox="1"/>
+          <p:nvPr/>
+        </p:nvSpPr>
+        <p:spPr>
+          <a:xfrm>
+            <a:off x="3553527" y="5335892"/>
+            <a:ext cx="6098058" cy="369332"/>
+          </a:xfrm>
+          <a:prstGeom prst="rect">
+            <a:avLst/>
+          </a:prstGeom>
+          <a:noFill/>
+        </p:spPr>
+        <p:txBody>
+          <a:bodyPr wrap="square">
+            <a:spAutoFit/>
+          </a:bodyPr>
+          <a:lstStyle/>
+          <a:p>
+            <a:r>
+              <a:rPr lang="en-US" b="0" i="0" dirty="0" err="1">
+                <a:solidFill>
+                  <a:srgbClr val="D63384"/>
+                </a:solidFill>
+                <a:effectLst/>
+                <a:latin typeface="Consolas" panose="020B0609020204030204" pitchFamily="49" charset="0"/>
+              </a:rPr>
+              <a:t>admin_login</a:t>
+            </a:r>
+            <a:endParaRPr lang="en-US" dirty="0"/>
+          </a:p>
+        </p:txBody>
+      </p:sp>
+    </p:spTree>
+    <p:extLst>
+      <p:ext uri="{BB962C8B-B14F-4D97-AF65-F5344CB8AC3E}">
+        <p14:creationId xmlns:p14="http://schemas.microsoft.com/office/powerpoint/2010/main" val="704764901"/>
+      </p:ext>
+    </p:extLst>
+  </p:cSld>
+  <p:clrMapOvr>
+    <a:masterClrMapping/>
+  </p:clrMapOvr>
+</p:sld>
+</file>
+
+<file path=ppt/slides/slide13.xml><?xml version="1.0" encoding="utf-8"?>
+<p:sld xmlns:a="http://schemas.openxmlformats.org/drawingml/2006/main" xmlns:r="http://schemas.openxmlformats.org/officeDocument/2006/relationships" xmlns:p="http://schemas.openxmlformats.org/presentationml/2006/main">
+  <p:cSld>
+    <p:spTree>
+      <p:nvGrpSpPr>
+        <p:cNvPr id="1" name="">
+          <a:extLst>
+            <a:ext uri="{FF2B5EF4-FFF2-40B4-BE49-F238E27FC236}">
+              <a16:creationId xmlns:a16="http://schemas.microsoft.com/office/drawing/2014/main" id="{018FF8EF-7A18-0AA3-D679-871CD16183CB}"/>
+            </a:ext>
+          </a:extLst>
+        </p:cNvPr>
+        <p:cNvGrpSpPr/>
+        <p:nvPr/>
+      </p:nvGrpSpPr>
+      <p:grpSpPr>
+        <a:xfrm>
+          <a:off x="0" y="0"/>
+          <a:ext cx="0" cy="0"/>
+          <a:chOff x="0" y="0"/>
+          <a:chExt cx="0" cy="0"/>
+        </a:xfrm>
+      </p:grpSpPr>
+      <p:pic>
+        <p:nvPicPr>
+          <p:cNvPr id="2" name="Picture 1">
+            <a:extLst>
+              <a:ext uri="{FF2B5EF4-FFF2-40B4-BE49-F238E27FC236}">
+                <a16:creationId xmlns:a16="http://schemas.microsoft.com/office/drawing/2014/main" id="{F76A48D5-8D8D-8910-F7AD-FC5A3865288B}"/>
+              </a:ext>
+            </a:extLst>
+          </p:cNvPr>
+          <p:cNvPicPr>
+            <a:picLocks noChangeAspect="1"/>
+          </p:cNvPicPr>
+          <p:nvPr/>
+        </p:nvPicPr>
+        <p:blipFill>
+          <a:blip r:embed="rId2"/>
+          <a:stretch>
+            <a:fillRect/>
+          </a:stretch>
+        </p:blipFill>
+        <p:spPr>
+          <a:xfrm>
+            <a:off x="2176736" y="1491156"/>
+            <a:ext cx="4559300" cy="1752600"/>
+          </a:xfrm>
+          <a:prstGeom prst="rect">
+            <a:avLst/>
+          </a:prstGeom>
+        </p:spPr>
+      </p:pic>
+      <p:sp>
+        <p:nvSpPr>
+          <p:cNvPr id="4" name="TextBox 3">
+            <a:extLst>
+              <a:ext uri="{FF2B5EF4-FFF2-40B4-BE49-F238E27FC236}">
+                <a16:creationId xmlns:a16="http://schemas.microsoft.com/office/drawing/2014/main" id="{278D1E49-755D-C207-5A36-9BBB0BED59CD}"/>
+              </a:ext>
+            </a:extLst>
+          </p:cNvPr>
+          <p:cNvSpPr txBox="1"/>
+          <p:nvPr/>
+        </p:nvSpPr>
+        <p:spPr>
+          <a:xfrm>
+            <a:off x="3184635" y="5716892"/>
+            <a:ext cx="6096000" cy="369332"/>
+          </a:xfrm>
+          <a:prstGeom prst="rect">
+            <a:avLst/>
+          </a:prstGeom>
+          <a:noFill/>
+        </p:spPr>
+        <p:txBody>
+          <a:bodyPr wrap="square">
+            <a:spAutoFit/>
+          </a:bodyPr>
+          <a:lstStyle/>
+          <a:p>
+            <a:r>
+              <a:rPr lang="en-US" b="0" i="0" dirty="0" err="1">
+                <a:solidFill>
+                  <a:srgbClr val="D63384"/>
+                </a:solidFill>
+                <a:effectLst/>
+                <a:latin typeface="Consolas" panose="020B0609020204030204" pitchFamily="49" charset="0"/>
+              </a:rPr>
+              <a:t>admin_logout</a:t>
+            </a:r>
+            <a:endParaRPr lang="en-US" dirty="0"/>
+          </a:p>
+        </p:txBody>
+      </p:sp>
+    </p:spTree>
+    <p:extLst>
+      <p:ext uri="{BB962C8B-B14F-4D97-AF65-F5344CB8AC3E}">
+        <p14:creationId xmlns:p14="http://schemas.microsoft.com/office/powerpoint/2010/main" val="2339268053"/>
+      </p:ext>
+    </p:extLst>
+  </p:cSld>
+  <p:clrMapOvr>
+    <a:masterClrMapping/>
+  </p:clrMapOvr>
+</p:sld>
+</file>
+
+<file path=ppt/slides/slide14.xml><?xml version="1.0" encoding="utf-8"?>
+<p:sld xmlns:a="http://schemas.openxmlformats.org/drawingml/2006/main" xmlns:r="http://schemas.openxmlformats.org/officeDocument/2006/relationships" xmlns:p="http://schemas.openxmlformats.org/presentationml/2006/main">
+  <p:cSld>
+    <p:spTree>
+      <p:nvGrpSpPr>
+        <p:cNvPr id="1" name="">
+          <a:extLst>
+            <a:ext uri="{FF2B5EF4-FFF2-40B4-BE49-F238E27FC236}">
+              <a16:creationId xmlns:a16="http://schemas.microsoft.com/office/drawing/2014/main" id="{0A6CAE5E-8968-594D-60C8-84D9DCD13D53}"/>
+            </a:ext>
+          </a:extLst>
+        </p:cNvPr>
+        <p:cNvGrpSpPr/>
+        <p:nvPr/>
+      </p:nvGrpSpPr>
+      <p:grpSpPr>
+        <a:xfrm>
+          <a:off x="0" y="0"/>
+          <a:ext cx="0" cy="0"/>
+          <a:chOff x="0" y="0"/>
+          <a:chExt cx="0" cy="0"/>
+        </a:xfrm>
+      </p:grpSpPr>
+      <p:pic>
+        <p:nvPicPr>
+          <p:cNvPr id="2" name="Picture 1">
+            <a:extLst>
+              <a:ext uri="{FF2B5EF4-FFF2-40B4-BE49-F238E27FC236}">
+                <a16:creationId xmlns:a16="http://schemas.microsoft.com/office/drawing/2014/main" id="{EC528A22-32FF-741C-E948-761CCD8DB99A}"/>
+              </a:ext>
+            </a:extLst>
+          </p:cNvPr>
+          <p:cNvPicPr>
+            <a:picLocks noChangeAspect="1"/>
+          </p:cNvPicPr>
+          <p:nvPr/>
+        </p:nvPicPr>
+        <p:blipFill>
+          <a:blip r:embed="rId2"/>
+          <a:stretch>
+            <a:fillRect/>
+          </a:stretch>
+        </p:blipFill>
+        <p:spPr>
+          <a:xfrm>
+            <a:off x="968922" y="325821"/>
+            <a:ext cx="5734707" cy="5712372"/>
+          </a:xfrm>
+          <a:prstGeom prst="rect">
+            <a:avLst/>
+          </a:prstGeom>
+        </p:spPr>
+      </p:pic>
+      <p:sp>
+        <p:nvSpPr>
+          <p:cNvPr id="4" name="TextBox 3">
+            <a:extLst>
+              <a:ext uri="{FF2B5EF4-FFF2-40B4-BE49-F238E27FC236}">
+                <a16:creationId xmlns:a16="http://schemas.microsoft.com/office/drawing/2014/main" id="{CBDB9E95-B78B-D3D1-84FA-80FF1252F6C4}"/>
+              </a:ext>
+            </a:extLst>
+          </p:cNvPr>
+          <p:cNvSpPr txBox="1"/>
+          <p:nvPr/>
+        </p:nvSpPr>
+        <p:spPr>
+          <a:xfrm>
+            <a:off x="8574472" y="2658382"/>
+            <a:ext cx="2554013" cy="369332"/>
+          </a:xfrm>
+          <a:prstGeom prst="rect">
+            <a:avLst/>
+          </a:prstGeom>
+          <a:noFill/>
+        </p:spPr>
+        <p:txBody>
+          <a:bodyPr wrap="square">
+            <a:spAutoFit/>
+          </a:bodyPr>
+          <a:lstStyle/>
+          <a:p>
+            <a:r>
+              <a:rPr lang="en-US" b="0" i="0" dirty="0">
+                <a:solidFill>
+                  <a:srgbClr val="D63384"/>
+                </a:solidFill>
+                <a:effectLst/>
+                <a:latin typeface="Consolas" panose="020B0609020204030204" pitchFamily="49" charset="0"/>
+              </a:rPr>
+              <a:t>cars</a:t>
+            </a:r>
+            <a:endParaRPr lang="en-US" dirty="0"/>
+          </a:p>
+        </p:txBody>
+      </p:sp>
+    </p:spTree>
+    <p:extLst>
+      <p:ext uri="{BB962C8B-B14F-4D97-AF65-F5344CB8AC3E}">
+        <p14:creationId xmlns:p14="http://schemas.microsoft.com/office/powerpoint/2010/main" val="4180084132"/>
+      </p:ext>
+    </p:extLst>
+  </p:cSld>
+  <p:clrMapOvr>
+    <a:masterClrMapping/>
+  </p:clrMapOvr>
+</p:sld>
+</file>
+
+<file path=ppt/slides/slide15.xml><?xml version="1.0" encoding="utf-8"?>
+<p:sld xmlns:a="http://schemas.openxmlformats.org/drawingml/2006/main" xmlns:r="http://schemas.openxmlformats.org/officeDocument/2006/relationships" xmlns:p="http://schemas.openxmlformats.org/presentationml/2006/main">
+  <p:cSld>
+    <p:spTree>
+      <p:nvGrpSpPr>
+        <p:cNvPr id="1" name="">
+          <a:extLst>
+            <a:ext uri="{FF2B5EF4-FFF2-40B4-BE49-F238E27FC236}">
+              <a16:creationId xmlns:a16="http://schemas.microsoft.com/office/drawing/2014/main" id="{2123270D-C438-081D-5589-18B52E0B82CD}"/>
+            </a:ext>
+          </a:extLst>
+        </p:cNvPr>
+        <p:cNvGrpSpPr/>
+        <p:nvPr/>
+      </p:nvGrpSpPr>
+      <p:grpSpPr>
+        <a:xfrm>
+          <a:off x="0" y="0"/>
+          <a:ext cx="0" cy="0"/>
+          <a:chOff x="0" y="0"/>
+          <a:chExt cx="0" cy="0"/>
+        </a:xfrm>
+      </p:grpSpPr>
+      <p:pic>
+        <p:nvPicPr>
+          <p:cNvPr id="2" name="Picture 1">
+            <a:extLst>
+              <a:ext uri="{FF2B5EF4-FFF2-40B4-BE49-F238E27FC236}">
+                <a16:creationId xmlns:a16="http://schemas.microsoft.com/office/drawing/2014/main" id="{0E590224-9CD4-9E2B-E6F4-90D20E3B128C}"/>
+              </a:ext>
+            </a:extLst>
+          </p:cNvPr>
+          <p:cNvPicPr>
+            <a:picLocks noChangeAspect="1"/>
+          </p:cNvPicPr>
+          <p:nvPr/>
+        </p:nvPicPr>
+        <p:blipFill>
+          <a:blip r:embed="rId2"/>
+          <a:stretch>
+            <a:fillRect/>
+          </a:stretch>
+        </p:blipFill>
+        <p:spPr>
+          <a:xfrm>
+            <a:off x="431972" y="739689"/>
+            <a:ext cx="6286500" cy="5156200"/>
+          </a:xfrm>
+          <a:prstGeom prst="rect">
+            <a:avLst/>
+          </a:prstGeom>
+        </p:spPr>
+      </p:pic>
+      <p:sp>
+        <p:nvSpPr>
+          <p:cNvPr id="4" name="TextBox 3">
+            <a:extLst>
+              <a:ext uri="{FF2B5EF4-FFF2-40B4-BE49-F238E27FC236}">
+                <a16:creationId xmlns:a16="http://schemas.microsoft.com/office/drawing/2014/main" id="{E688AB1F-E0B7-E60A-2D99-2562D11AC4E6}"/>
+              </a:ext>
+            </a:extLst>
+          </p:cNvPr>
+          <p:cNvSpPr txBox="1"/>
+          <p:nvPr/>
+        </p:nvSpPr>
+        <p:spPr>
+          <a:xfrm>
+            <a:off x="8304202" y="2361465"/>
+            <a:ext cx="2658087" cy="369332"/>
+          </a:xfrm>
+          <a:prstGeom prst="rect">
+            <a:avLst/>
+          </a:prstGeom>
+          <a:noFill/>
+        </p:spPr>
+        <p:txBody>
+          <a:bodyPr wrap="square">
+            <a:spAutoFit/>
+          </a:bodyPr>
+          <a:lstStyle/>
+          <a:p>
+            <a:r>
+              <a:rPr lang="en-US" b="0" i="0" dirty="0">
+                <a:solidFill>
+                  <a:srgbClr val="D63384"/>
+                </a:solidFill>
+                <a:effectLst/>
+                <a:latin typeface="Consolas" panose="020B0609020204030204" pitchFamily="49" charset="0"/>
+              </a:rPr>
+              <a:t>car models</a:t>
+            </a:r>
+            <a:endParaRPr lang="en-US" dirty="0"/>
+          </a:p>
+        </p:txBody>
+      </p:sp>
+    </p:spTree>
+    <p:extLst>
+      <p:ext uri="{BB962C8B-B14F-4D97-AF65-F5344CB8AC3E}">
+        <p14:creationId xmlns:p14="http://schemas.microsoft.com/office/powerpoint/2010/main" val="1336144264"/>
+      </p:ext>
+    </p:extLst>
+  </p:cSld>
+  <p:clrMapOvr>
+    <a:masterClrMapping/>
+  </p:clrMapOvr>
+</p:sld>
+</file>
+
+<file path=ppt/slides/slide16.xml><?xml version="1.0" encoding="utf-8"?>
+<p:sld xmlns:a="http://schemas.openxmlformats.org/drawingml/2006/main" xmlns:r="http://schemas.openxmlformats.org/officeDocument/2006/relationships" xmlns:p="http://schemas.openxmlformats.org/presentationml/2006/main">
+  <p:cSld>
+    <p:spTree>
+      <p:nvGrpSpPr>
+        <p:cNvPr id="1" name="">
+          <a:extLst>
+            <a:ext uri="{FF2B5EF4-FFF2-40B4-BE49-F238E27FC236}">
+              <a16:creationId xmlns:a16="http://schemas.microsoft.com/office/drawing/2014/main" id="{A7D7DD59-BF0B-D10D-9F4F-9D2E82C8D2DF}"/>
+            </a:ext>
+          </a:extLst>
+        </p:cNvPr>
+        <p:cNvGrpSpPr/>
+        <p:nvPr/>
+      </p:nvGrpSpPr>
+      <p:grpSpPr>
+        <a:xfrm>
+          <a:off x="0" y="0"/>
+          <a:ext cx="0" cy="0"/>
+          <a:chOff x="0" y="0"/>
+          <a:chExt cx="0" cy="0"/>
+        </a:xfrm>
+      </p:grpSpPr>
+      <p:pic>
+        <p:nvPicPr>
+          <p:cNvPr id="2" name="Picture 1">
+            <a:extLst>
+              <a:ext uri="{FF2B5EF4-FFF2-40B4-BE49-F238E27FC236}">
+                <a16:creationId xmlns:a16="http://schemas.microsoft.com/office/drawing/2014/main" id="{161F690D-04FE-3F49-E379-8A31CB7456DE}"/>
+              </a:ext>
+            </a:extLst>
+          </p:cNvPr>
+          <p:cNvPicPr>
+            <a:picLocks noChangeAspect="1"/>
+          </p:cNvPicPr>
+          <p:nvPr/>
+        </p:nvPicPr>
+        <p:blipFill>
+          <a:blip r:embed="rId2"/>
+          <a:stretch>
+            <a:fillRect/>
+          </a:stretch>
+        </p:blipFill>
+        <p:spPr>
+          <a:xfrm>
+            <a:off x="3486150" y="3168650"/>
+            <a:ext cx="5219700" cy="520700"/>
+          </a:xfrm>
+          <a:prstGeom prst="rect">
+            <a:avLst/>
+          </a:prstGeom>
+        </p:spPr>
+      </p:pic>
+      <p:sp>
+        <p:nvSpPr>
+          <p:cNvPr id="4" name="TextBox 3">
+            <a:extLst>
+              <a:ext uri="{FF2B5EF4-FFF2-40B4-BE49-F238E27FC236}">
+                <a16:creationId xmlns:a16="http://schemas.microsoft.com/office/drawing/2014/main" id="{8707A1DA-A7C7-5CDF-C65D-017309254F2D}"/>
+              </a:ext>
+            </a:extLst>
+          </p:cNvPr>
+          <p:cNvSpPr txBox="1"/>
+          <p:nvPr/>
+        </p:nvSpPr>
+        <p:spPr>
+          <a:xfrm>
+            <a:off x="3762704" y="4834023"/>
+            <a:ext cx="6096000" cy="369332"/>
+          </a:xfrm>
+          <a:prstGeom prst="rect">
+            <a:avLst/>
+          </a:prstGeom>
+          <a:noFill/>
+        </p:spPr>
+        <p:txBody>
+          <a:bodyPr wrap="square">
+            <a:spAutoFit/>
+          </a:bodyPr>
+          <a:lstStyle/>
+          <a:p>
+            <a:r>
+              <a:rPr lang="en-US" b="0" i="0" dirty="0" err="1">
+                <a:solidFill>
+                  <a:srgbClr val="D63384"/>
+                </a:solidFill>
+                <a:effectLst/>
+                <a:latin typeface="Consolas" panose="020B0609020204030204" pitchFamily="49" charset="0"/>
+              </a:rPr>
+              <a:t>sentiment_analyzer</a:t>
+            </a:r>
+            <a:endParaRPr lang="en-US" dirty="0"/>
+          </a:p>
+        </p:txBody>
+      </p:sp>
+    </p:spTree>
+    <p:extLst>
+      <p:ext uri="{BB962C8B-B14F-4D97-AF65-F5344CB8AC3E}">
+        <p14:creationId xmlns:p14="http://schemas.microsoft.com/office/powerpoint/2010/main" val="629100352"/>
+      </p:ext>
+    </p:extLst>
+  </p:cSld>
+  <p:clrMapOvr>
+    <a:masterClrMapping/>
+  </p:clrMapOvr>
+</p:sld>
+</file>
+
+<file path=ppt/slides/slide17.xml><?xml version="1.0" encoding="utf-8"?>
+<p:sld xmlns:a="http://schemas.openxmlformats.org/drawingml/2006/main" xmlns:r="http://schemas.openxmlformats.org/officeDocument/2006/relationships" xmlns:p="http://schemas.openxmlformats.org/presentationml/2006/main">
+  <p:cSld>
+    <p:spTree>
+      <p:nvGrpSpPr>
+        <p:cNvPr id="1" name="">
+          <a:extLst>
+            <a:ext uri="{FF2B5EF4-FFF2-40B4-BE49-F238E27FC236}">
+              <a16:creationId xmlns:a16="http://schemas.microsoft.com/office/drawing/2014/main" id="{E5B7209D-D638-A34E-3CB0-00E80DAF6CCB}"/>
+            </a:ext>
+          </a:extLst>
+        </p:cNvPr>
+        <p:cNvGrpSpPr/>
+        <p:nvPr/>
+      </p:nvGrpSpPr>
+      <p:grpSpPr>
+        <a:xfrm>
+          <a:off x="0" y="0"/>
+          <a:ext cx="0" cy="0"/>
+          <a:chOff x="0" y="0"/>
+          <a:chExt cx="0" cy="0"/>
+        </a:xfrm>
+      </p:grpSpPr>
+      <p:pic>
+        <p:nvPicPr>
+          <p:cNvPr id="2" name="Picture 1">
+            <a:extLst>
+              <a:ext uri="{FF2B5EF4-FFF2-40B4-BE49-F238E27FC236}">
+                <a16:creationId xmlns:a16="http://schemas.microsoft.com/office/drawing/2014/main" id="{3F3E0486-858B-EB5F-5C6B-FFB65DAC4C6A}"/>
+              </a:ext>
+            </a:extLst>
+          </p:cNvPr>
+          <p:cNvPicPr>
+            <a:picLocks noChangeAspect="1"/>
+          </p:cNvPicPr>
+          <p:nvPr/>
+        </p:nvPicPr>
+        <p:blipFill>
+          <a:blip r:embed="rId2"/>
+          <a:stretch>
+            <a:fillRect/>
+          </a:stretch>
+        </p:blipFill>
+        <p:spPr>
+          <a:xfrm>
+            <a:off x="1013153" y="502543"/>
+            <a:ext cx="7772400" cy="3189617"/>
+          </a:xfrm>
+          <a:prstGeom prst="rect">
+            <a:avLst/>
+          </a:prstGeom>
+        </p:spPr>
+      </p:pic>
+      <p:sp>
+        <p:nvSpPr>
+          <p:cNvPr id="4" name="TextBox 3">
+            <a:extLst>
+              <a:ext uri="{FF2B5EF4-FFF2-40B4-BE49-F238E27FC236}">
+                <a16:creationId xmlns:a16="http://schemas.microsoft.com/office/drawing/2014/main" id="{9ADF6B69-F464-5F9C-400A-A3DCA9548293}"/>
+              </a:ext>
+            </a:extLst>
+          </p:cNvPr>
+          <p:cNvSpPr txBox="1"/>
+          <p:nvPr/>
+        </p:nvSpPr>
+        <p:spPr>
+          <a:xfrm>
+            <a:off x="2912998" y="4912195"/>
+            <a:ext cx="6103088" cy="369332"/>
+          </a:xfrm>
+          <a:prstGeom prst="rect">
+            <a:avLst/>
+          </a:prstGeom>
+          <a:noFill/>
+        </p:spPr>
+        <p:txBody>
+          <a:bodyPr wrap="square">
+            <a:spAutoFit/>
+          </a:bodyPr>
+          <a:lstStyle/>
+          <a:p>
+            <a:r>
+              <a:rPr lang="en-US" b="0" i="0" dirty="0" err="1">
+                <a:solidFill>
+                  <a:srgbClr val="D63384"/>
+                </a:solidFill>
+                <a:effectLst/>
+                <a:latin typeface="Consolas" panose="020B0609020204030204" pitchFamily="49" charset="0"/>
+              </a:rPr>
+              <a:t>get_dealers</a:t>
+            </a:r>
+            <a:endParaRPr lang="en-US" dirty="0"/>
+          </a:p>
+        </p:txBody>
+      </p:sp>
+    </p:spTree>
+    <p:extLst>
+      <p:ext uri="{BB962C8B-B14F-4D97-AF65-F5344CB8AC3E}">
+        <p14:creationId xmlns:p14="http://schemas.microsoft.com/office/powerpoint/2010/main" val="4239599774"/>
+      </p:ext>
+    </p:extLst>
+  </p:cSld>
+  <p:clrMapOvr>
+    <a:masterClrMapping/>
+  </p:clrMapOvr>
+</p:sld>
+</file>
+
+<file path=ppt/slides/slide18.xml><?xml version="1.0" encoding="utf-8"?>
+<p:sld xmlns:a="http://schemas.openxmlformats.org/drawingml/2006/main" xmlns:r="http://schemas.openxmlformats.org/officeDocument/2006/relationships" xmlns:p="http://schemas.openxmlformats.org/presentationml/2006/main">
+  <p:cSld>
+    <p:spTree>
+      <p:nvGrpSpPr>
+        <p:cNvPr id="1" name="">
+          <a:extLst>
+            <a:ext uri="{FF2B5EF4-FFF2-40B4-BE49-F238E27FC236}">
+              <a16:creationId xmlns:a16="http://schemas.microsoft.com/office/drawing/2014/main" id="{8C832F07-A2F6-C766-B22D-84BA05112F16}"/>
+            </a:ext>
+          </a:extLst>
+        </p:cNvPr>
+        <p:cNvGrpSpPr/>
+        <p:nvPr/>
+      </p:nvGrpSpPr>
+      <p:grpSpPr>
+        <a:xfrm>
+          <a:off x="0" y="0"/>
+          <a:ext cx="0" cy="0"/>
+          <a:chOff x="0" y="0"/>
+          <a:chExt cx="0" cy="0"/>
+        </a:xfrm>
+      </p:grpSpPr>
+      <p:pic>
+        <p:nvPicPr>
+          <p:cNvPr id="2" name="Picture 1">
+            <a:extLst>
+              <a:ext uri="{FF2B5EF4-FFF2-40B4-BE49-F238E27FC236}">
+                <a16:creationId xmlns:a16="http://schemas.microsoft.com/office/drawing/2014/main" id="{DE92010B-38D0-B28B-3697-8E38593FCB2A}"/>
+              </a:ext>
+            </a:extLst>
+          </p:cNvPr>
+          <p:cNvPicPr>
+            <a:picLocks noChangeAspect="1"/>
+          </p:cNvPicPr>
+          <p:nvPr/>
+        </p:nvPicPr>
+        <p:blipFill>
+          <a:blip r:embed="rId2"/>
+          <a:stretch>
+            <a:fillRect/>
+          </a:stretch>
+        </p:blipFill>
+        <p:spPr>
+          <a:xfrm>
+            <a:off x="1572490" y="1011225"/>
+            <a:ext cx="7772400" cy="3089877"/>
+          </a:xfrm>
+          <a:prstGeom prst="rect">
+            <a:avLst/>
+          </a:prstGeom>
+        </p:spPr>
+      </p:pic>
+      <p:sp>
+        <p:nvSpPr>
+          <p:cNvPr id="4" name="TextBox 3">
+            <a:extLst>
+              <a:ext uri="{FF2B5EF4-FFF2-40B4-BE49-F238E27FC236}">
+                <a16:creationId xmlns:a16="http://schemas.microsoft.com/office/drawing/2014/main" id="{B244D738-61BE-A312-A2E4-47C7834F77D3}"/>
+              </a:ext>
+            </a:extLst>
+          </p:cNvPr>
+          <p:cNvSpPr txBox="1"/>
+          <p:nvPr/>
+        </p:nvSpPr>
+        <p:spPr>
+          <a:xfrm>
+            <a:off x="3048000" y="5086988"/>
+            <a:ext cx="6096000" cy="369332"/>
+          </a:xfrm>
+          <a:prstGeom prst="rect">
+            <a:avLst/>
+          </a:prstGeom>
+          <a:noFill/>
+        </p:spPr>
+        <p:txBody>
+          <a:bodyPr wrap="square">
+            <a:spAutoFit/>
+          </a:bodyPr>
+          <a:lstStyle/>
+          <a:p>
+            <a:r>
+              <a:rPr lang="en-US" b="0" i="0" dirty="0" err="1">
+                <a:solidFill>
+                  <a:srgbClr val="D63384"/>
+                </a:solidFill>
+                <a:effectLst/>
+                <a:latin typeface="Consolas" panose="020B0609020204030204" pitchFamily="49" charset="0"/>
+              </a:rPr>
+              <a:t>get_dealers_loggedin</a:t>
+            </a:r>
+            <a:endParaRPr lang="en-US" dirty="0"/>
+          </a:p>
+        </p:txBody>
+      </p:sp>
+    </p:spTree>
+    <p:extLst>
+      <p:ext uri="{BB962C8B-B14F-4D97-AF65-F5344CB8AC3E}">
+        <p14:creationId xmlns:p14="http://schemas.microsoft.com/office/powerpoint/2010/main" val="3005931986"/>
+      </p:ext>
+    </p:extLst>
+  </p:cSld>
+  <p:clrMapOvr>
+    <a:masterClrMapping/>
+  </p:clrMapOvr>
+</p:sld>
+</file>
+
+<file path=ppt/slides/slide19.xml><?xml version="1.0" encoding="utf-8"?>
+<p:sld xmlns:a="http://schemas.openxmlformats.org/drawingml/2006/main" xmlns:r="http://schemas.openxmlformats.org/officeDocument/2006/relationships" xmlns:p="http://schemas.openxmlformats.org/presentationml/2006/main">
+  <p:cSld>
+    <p:spTree>
+      <p:nvGrpSpPr>
+        <p:cNvPr id="1" name="">
+          <a:extLst>
+            <a:ext uri="{FF2B5EF4-FFF2-40B4-BE49-F238E27FC236}">
+              <a16:creationId xmlns:a16="http://schemas.microsoft.com/office/drawing/2014/main" id="{FBD0EA53-6583-C586-4AB5-72FAB3ECEF08}"/>
+            </a:ext>
+          </a:extLst>
+        </p:cNvPr>
+        <p:cNvGrpSpPr/>
+        <p:nvPr/>
+      </p:nvGrpSpPr>
+      <p:grpSpPr>
+        <a:xfrm>
+          <a:off x="0" y="0"/>
+          <a:ext cx="0" cy="0"/>
+          <a:chOff x="0" y="0"/>
+          <a:chExt cx="0" cy="0"/>
+        </a:xfrm>
+      </p:grpSpPr>
+      <p:pic>
+        <p:nvPicPr>
+          <p:cNvPr id="3" name="Picture 2">
+            <a:extLst>
+              <a:ext uri="{FF2B5EF4-FFF2-40B4-BE49-F238E27FC236}">
+                <a16:creationId xmlns:a16="http://schemas.microsoft.com/office/drawing/2014/main" id="{6083AFEA-4250-652F-E6B3-0A76C5537F86}"/>
+              </a:ext>
+            </a:extLst>
+          </p:cNvPr>
+          <p:cNvPicPr>
+            <a:picLocks noChangeAspect="1"/>
+          </p:cNvPicPr>
+          <p:nvPr/>
+        </p:nvPicPr>
+        <p:blipFill>
+          <a:blip r:embed="rId2"/>
+          <a:stretch>
+            <a:fillRect/>
+          </a:stretch>
+        </p:blipFill>
+        <p:spPr>
+          <a:xfrm>
+            <a:off x="2209800" y="767854"/>
+            <a:ext cx="7772400" cy="2813008"/>
+          </a:xfrm>
+          <a:prstGeom prst="rect">
+            <a:avLst/>
+          </a:prstGeom>
+        </p:spPr>
+      </p:pic>
+      <p:sp>
+        <p:nvSpPr>
+          <p:cNvPr id="5" name="TextBox 4">
+            <a:extLst>
+              <a:ext uri="{FF2B5EF4-FFF2-40B4-BE49-F238E27FC236}">
+                <a16:creationId xmlns:a16="http://schemas.microsoft.com/office/drawing/2014/main" id="{F6C4F41E-302D-0A84-6836-F8BE2239071E}"/>
+              </a:ext>
+            </a:extLst>
+          </p:cNvPr>
+          <p:cNvSpPr txBox="1"/>
+          <p:nvPr/>
+        </p:nvSpPr>
+        <p:spPr>
+          <a:xfrm>
+            <a:off x="3364882" y="4870631"/>
+            <a:ext cx="6092456" cy="369332"/>
+          </a:xfrm>
+          <a:prstGeom prst="rect">
+            <a:avLst/>
+          </a:prstGeom>
+          <a:noFill/>
+        </p:spPr>
+        <p:txBody>
+          <a:bodyPr wrap="square">
+            <a:spAutoFit/>
+          </a:bodyPr>
+          <a:lstStyle/>
+          <a:p>
+            <a:r>
+              <a:rPr lang="en-US" b="0" i="0" dirty="0" err="1">
+                <a:solidFill>
+                  <a:srgbClr val="D63384"/>
+                </a:solidFill>
+                <a:effectLst/>
+                <a:latin typeface="Consolas" panose="020B0609020204030204" pitchFamily="49" charset="0"/>
+              </a:rPr>
+              <a:t>dealersbystate</a:t>
+            </a:r>
+            <a:endParaRPr lang="en-US" dirty="0"/>
+          </a:p>
+        </p:txBody>
+      </p:sp>
+    </p:spTree>
+    <p:extLst>
+      <p:ext uri="{BB962C8B-B14F-4D97-AF65-F5344CB8AC3E}">
+        <p14:creationId xmlns:p14="http://schemas.microsoft.com/office/powerpoint/2010/main" val="2012696606"/>
       </p:ext>
     </p:extLst>
   </p:cSld>
@@ -3555,6 +4615,258 @@
     <p:extLst>
       <p:ext uri="{BB962C8B-B14F-4D97-AF65-F5344CB8AC3E}">
         <p14:creationId xmlns:p14="http://schemas.microsoft.com/office/powerpoint/2010/main" val="707039997"/>
+      </p:ext>
+    </p:extLst>
+  </p:cSld>
+  <p:clrMapOvr>
+    <a:masterClrMapping/>
+  </p:clrMapOvr>
+</p:sld>
+</file>
+
+<file path=ppt/slides/slide20.xml><?xml version="1.0" encoding="utf-8"?>
+<p:sld xmlns:a="http://schemas.openxmlformats.org/drawingml/2006/main" xmlns:r="http://schemas.openxmlformats.org/officeDocument/2006/relationships" xmlns:p="http://schemas.openxmlformats.org/presentationml/2006/main">
+  <p:cSld>
+    <p:spTree>
+      <p:nvGrpSpPr>
+        <p:cNvPr id="1" name="">
+          <a:extLst>
+            <a:ext uri="{FF2B5EF4-FFF2-40B4-BE49-F238E27FC236}">
+              <a16:creationId xmlns:a16="http://schemas.microsoft.com/office/drawing/2014/main" id="{11F452BA-595C-7192-5E67-928DACB9A6A7}"/>
+            </a:ext>
+          </a:extLst>
+        </p:cNvPr>
+        <p:cNvGrpSpPr/>
+        <p:nvPr/>
+      </p:nvGrpSpPr>
+      <p:grpSpPr>
+        <a:xfrm>
+          <a:off x="0" y="0"/>
+          <a:ext cx="0" cy="0"/>
+          <a:chOff x="0" y="0"/>
+          <a:chExt cx="0" cy="0"/>
+        </a:xfrm>
+      </p:grpSpPr>
+    </p:spTree>
+    <p:extLst>
+      <p:ext uri="{BB962C8B-B14F-4D97-AF65-F5344CB8AC3E}">
+        <p14:creationId xmlns:p14="http://schemas.microsoft.com/office/powerpoint/2010/main" val="2200430138"/>
+      </p:ext>
+    </p:extLst>
+  </p:cSld>
+  <p:clrMapOvr>
+    <a:masterClrMapping/>
+  </p:clrMapOvr>
+</p:sld>
+</file>
+
+<file path=ppt/slides/slide21.xml><?xml version="1.0" encoding="utf-8"?>
+<p:sld xmlns:a="http://schemas.openxmlformats.org/drawingml/2006/main" xmlns:r="http://schemas.openxmlformats.org/officeDocument/2006/relationships" xmlns:p="http://schemas.openxmlformats.org/presentationml/2006/main">
+  <p:cSld>
+    <p:spTree>
+      <p:nvGrpSpPr>
+        <p:cNvPr id="1" name="">
+          <a:extLst>
+            <a:ext uri="{FF2B5EF4-FFF2-40B4-BE49-F238E27FC236}">
+              <a16:creationId xmlns:a16="http://schemas.microsoft.com/office/drawing/2014/main" id="{482AD358-7659-36B5-3CB8-ED3909BDF1D9}"/>
+            </a:ext>
+          </a:extLst>
+        </p:cNvPr>
+        <p:cNvGrpSpPr/>
+        <p:nvPr/>
+      </p:nvGrpSpPr>
+      <p:grpSpPr>
+        <a:xfrm>
+          <a:off x="0" y="0"/>
+          <a:ext cx="0" cy="0"/>
+          <a:chOff x="0" y="0"/>
+          <a:chExt cx="0" cy="0"/>
+        </a:xfrm>
+      </p:grpSpPr>
+    </p:spTree>
+    <p:extLst>
+      <p:ext uri="{BB962C8B-B14F-4D97-AF65-F5344CB8AC3E}">
+        <p14:creationId xmlns:p14="http://schemas.microsoft.com/office/powerpoint/2010/main" val="1565097526"/>
+      </p:ext>
+    </p:extLst>
+  </p:cSld>
+  <p:clrMapOvr>
+    <a:masterClrMapping/>
+  </p:clrMapOvr>
+</p:sld>
+</file>
+
+<file path=ppt/slides/slide22.xml><?xml version="1.0" encoding="utf-8"?>
+<p:sld xmlns:a="http://schemas.openxmlformats.org/drawingml/2006/main" xmlns:r="http://schemas.openxmlformats.org/officeDocument/2006/relationships" xmlns:p="http://schemas.openxmlformats.org/presentationml/2006/main">
+  <p:cSld>
+    <p:spTree>
+      <p:nvGrpSpPr>
+        <p:cNvPr id="1" name="">
+          <a:extLst>
+            <a:ext uri="{FF2B5EF4-FFF2-40B4-BE49-F238E27FC236}">
+              <a16:creationId xmlns:a16="http://schemas.microsoft.com/office/drawing/2014/main" id="{82C53D8B-AEF7-44D2-7335-69B1432C9B0E}"/>
+            </a:ext>
+          </a:extLst>
+        </p:cNvPr>
+        <p:cNvGrpSpPr/>
+        <p:nvPr/>
+      </p:nvGrpSpPr>
+      <p:grpSpPr>
+        <a:xfrm>
+          <a:off x="0" y="0"/>
+          <a:ext cx="0" cy="0"/>
+          <a:chOff x="0" y="0"/>
+          <a:chExt cx="0" cy="0"/>
+        </a:xfrm>
+      </p:grpSpPr>
+    </p:spTree>
+    <p:extLst>
+      <p:ext uri="{BB962C8B-B14F-4D97-AF65-F5344CB8AC3E}">
+        <p14:creationId xmlns:p14="http://schemas.microsoft.com/office/powerpoint/2010/main" val="3014678763"/>
+      </p:ext>
+    </p:extLst>
+  </p:cSld>
+  <p:clrMapOvr>
+    <a:masterClrMapping/>
+  </p:clrMapOvr>
+</p:sld>
+</file>
+
+<file path=ppt/slides/slide23.xml><?xml version="1.0" encoding="utf-8"?>
+<p:sld xmlns:a="http://schemas.openxmlformats.org/drawingml/2006/main" xmlns:r="http://schemas.openxmlformats.org/officeDocument/2006/relationships" xmlns:p="http://schemas.openxmlformats.org/presentationml/2006/main">
+  <p:cSld>
+    <p:spTree>
+      <p:nvGrpSpPr>
+        <p:cNvPr id="1" name="">
+          <a:extLst>
+            <a:ext uri="{FF2B5EF4-FFF2-40B4-BE49-F238E27FC236}">
+              <a16:creationId xmlns:a16="http://schemas.microsoft.com/office/drawing/2014/main" id="{BE4D270D-6D55-AAF8-96A2-683B17B8790A}"/>
+            </a:ext>
+          </a:extLst>
+        </p:cNvPr>
+        <p:cNvGrpSpPr/>
+        <p:nvPr/>
+      </p:nvGrpSpPr>
+      <p:grpSpPr>
+        <a:xfrm>
+          <a:off x="0" y="0"/>
+          <a:ext cx="0" cy="0"/>
+          <a:chOff x="0" y="0"/>
+          <a:chExt cx="0" cy="0"/>
+        </a:xfrm>
+      </p:grpSpPr>
+    </p:spTree>
+    <p:extLst>
+      <p:ext uri="{BB962C8B-B14F-4D97-AF65-F5344CB8AC3E}">
+        <p14:creationId xmlns:p14="http://schemas.microsoft.com/office/powerpoint/2010/main" val="99077459"/>
+      </p:ext>
+    </p:extLst>
+  </p:cSld>
+  <p:clrMapOvr>
+    <a:masterClrMapping/>
+  </p:clrMapOvr>
+</p:sld>
+</file>
+
+<file path=ppt/slides/slide24.xml><?xml version="1.0" encoding="utf-8"?>
+<p:sld xmlns:a="http://schemas.openxmlformats.org/drawingml/2006/main" xmlns:r="http://schemas.openxmlformats.org/officeDocument/2006/relationships" xmlns:p="http://schemas.openxmlformats.org/presentationml/2006/main">
+  <p:cSld>
+    <p:spTree>
+      <p:nvGrpSpPr>
+        <p:cNvPr id="1" name="">
+          <a:extLst>
+            <a:ext uri="{FF2B5EF4-FFF2-40B4-BE49-F238E27FC236}">
+              <a16:creationId xmlns:a16="http://schemas.microsoft.com/office/drawing/2014/main" id="{0CC2CE1E-100A-A071-9094-EE1451233C7D}"/>
+            </a:ext>
+          </a:extLst>
+        </p:cNvPr>
+        <p:cNvGrpSpPr/>
+        <p:nvPr/>
+      </p:nvGrpSpPr>
+      <p:grpSpPr>
+        <a:xfrm>
+          <a:off x="0" y="0"/>
+          <a:ext cx="0" cy="0"/>
+          <a:chOff x="0" y="0"/>
+          <a:chExt cx="0" cy="0"/>
+        </a:xfrm>
+      </p:grpSpPr>
+    </p:spTree>
+    <p:extLst>
+      <p:ext uri="{BB962C8B-B14F-4D97-AF65-F5344CB8AC3E}">
+        <p14:creationId xmlns:p14="http://schemas.microsoft.com/office/powerpoint/2010/main" val="462714060"/>
+      </p:ext>
+    </p:extLst>
+  </p:cSld>
+  <p:clrMapOvr>
+    <a:masterClrMapping/>
+  </p:clrMapOvr>
+</p:sld>
+</file>
+
+<file path=ppt/slides/slide25.xml><?xml version="1.0" encoding="utf-8"?>
+<p:sld xmlns:a="http://schemas.openxmlformats.org/drawingml/2006/main" xmlns:r="http://schemas.openxmlformats.org/officeDocument/2006/relationships" xmlns:p="http://schemas.openxmlformats.org/presentationml/2006/main">
+  <p:cSld>
+    <p:spTree>
+      <p:nvGrpSpPr>
+        <p:cNvPr id="1" name="">
+          <a:extLst>
+            <a:ext uri="{FF2B5EF4-FFF2-40B4-BE49-F238E27FC236}">
+              <a16:creationId xmlns:a16="http://schemas.microsoft.com/office/drawing/2014/main" id="{2931DC6F-9E81-5ACA-3C2B-96BF08736C73}"/>
+            </a:ext>
+          </a:extLst>
+        </p:cNvPr>
+        <p:cNvGrpSpPr/>
+        <p:nvPr/>
+      </p:nvGrpSpPr>
+      <p:grpSpPr>
+        <a:xfrm>
+          <a:off x="0" y="0"/>
+          <a:ext cx="0" cy="0"/>
+          <a:chOff x="0" y="0"/>
+          <a:chExt cx="0" cy="0"/>
+        </a:xfrm>
+      </p:grpSpPr>
+    </p:spTree>
+    <p:extLst>
+      <p:ext uri="{BB962C8B-B14F-4D97-AF65-F5344CB8AC3E}">
+        <p14:creationId xmlns:p14="http://schemas.microsoft.com/office/powerpoint/2010/main" val="1170881195"/>
+      </p:ext>
+    </p:extLst>
+  </p:cSld>
+  <p:clrMapOvr>
+    <a:masterClrMapping/>
+  </p:clrMapOvr>
+</p:sld>
+</file>
+
+<file path=ppt/slides/slide26.xml><?xml version="1.0" encoding="utf-8"?>
+<p:sld xmlns:a="http://schemas.openxmlformats.org/drawingml/2006/main" xmlns:r="http://schemas.openxmlformats.org/officeDocument/2006/relationships" xmlns:p="http://schemas.openxmlformats.org/presentationml/2006/main">
+  <p:cSld>
+    <p:spTree>
+      <p:nvGrpSpPr>
+        <p:cNvPr id="1" name="">
+          <a:extLst>
+            <a:ext uri="{FF2B5EF4-FFF2-40B4-BE49-F238E27FC236}">
+              <a16:creationId xmlns:a16="http://schemas.microsoft.com/office/drawing/2014/main" id="{BB24A4ED-7FB4-1A26-39C8-36576C091ED3}"/>
+            </a:ext>
+          </a:extLst>
+        </p:cNvPr>
+        <p:cNvGrpSpPr/>
+        <p:nvPr/>
+      </p:nvGrpSpPr>
+      <p:grpSpPr>
+        <a:xfrm>
+          <a:off x="0" y="0"/>
+          <a:ext cx="0" cy="0"/>
+          <a:chOff x="0" y="0"/>
+          <a:chExt cx="0" cy="0"/>
+        </a:xfrm>
+      </p:grpSpPr>
+    </p:spTree>
+    <p:extLst>
+      <p:ext uri="{BB962C8B-B14F-4D97-AF65-F5344CB8AC3E}">
+        <p14:creationId xmlns:p14="http://schemas.microsoft.com/office/powerpoint/2010/main" val="2422693164"/>
       </p:ext>
     </p:extLst>
   </p:cSld>
@@ -4022,6 +5334,78 @@
           <a:chExt cx="0" cy="0"/>
         </a:xfrm>
       </p:grpSpPr>
+      <p:pic>
+        <p:nvPicPr>
+          <p:cNvPr id="2" name="Picture 1">
+            <a:extLst>
+              <a:ext uri="{FF2B5EF4-FFF2-40B4-BE49-F238E27FC236}">
+                <a16:creationId xmlns:a16="http://schemas.microsoft.com/office/drawing/2014/main" id="{AFA3077D-D7B0-6D95-263F-161735F0DEF1}"/>
+              </a:ext>
+            </a:extLst>
+          </p:cNvPr>
+          <p:cNvPicPr>
+            <a:picLocks noChangeAspect="1"/>
+          </p:cNvPicPr>
+          <p:nvPr/>
+        </p:nvPicPr>
+        <p:blipFill>
+          <a:blip r:embed="rId2"/>
+          <a:stretch>
+            <a:fillRect/>
+          </a:stretch>
+        </p:blipFill>
+        <p:spPr>
+          <a:xfrm>
+            <a:off x="1543246" y="368533"/>
+            <a:ext cx="7772400" cy="4650340"/>
+          </a:xfrm>
+          <a:prstGeom prst="rect">
+            <a:avLst/>
+          </a:prstGeom>
+        </p:spPr>
+      </p:pic>
+      <p:sp>
+        <p:nvSpPr>
+          <p:cNvPr id="4" name="TextBox 3">
+            <a:extLst>
+              <a:ext uri="{FF2B5EF4-FFF2-40B4-BE49-F238E27FC236}">
+                <a16:creationId xmlns:a16="http://schemas.microsoft.com/office/drawing/2014/main" id="{743646FE-83E3-490E-6C30-7BD8B640B3DA}"/>
+              </a:ext>
+            </a:extLst>
+          </p:cNvPr>
+          <p:cNvSpPr txBox="1"/>
+          <p:nvPr/>
+        </p:nvSpPr>
+        <p:spPr>
+          <a:xfrm>
+            <a:off x="3143623" y="5756306"/>
+            <a:ext cx="6098058" cy="369332"/>
+          </a:xfrm>
+          <a:prstGeom prst="rect">
+            <a:avLst/>
+          </a:prstGeom>
+          <a:noFill/>
+        </p:spPr>
+        <p:txBody>
+          <a:bodyPr wrap="square">
+            <a:spAutoFit/>
+          </a:bodyPr>
+          <a:lstStyle/>
+          <a:p>
+            <a:r>
+              <a:rPr lang="en-US" b="0" i="0" dirty="0">
+                <a:solidFill>
+                  <a:srgbClr val="D63384"/>
+                </a:solidFill>
+                <a:effectLst/>
+                <a:latin typeface="Consolas" panose="020B0609020204030204" pitchFamily="49" charset="0"/>
+              </a:rPr>
+              <a:t>logout</a:t>
+            </a:r>
+            <a:endParaRPr lang="en-US" dirty="0"/>
+          </a:p>
+        </p:txBody>
+      </p:sp>
     </p:spTree>
     <p:extLst>
       <p:ext uri="{BB962C8B-B14F-4D97-AF65-F5344CB8AC3E}">
@@ -4058,6 +5442,78 @@
           <a:chExt cx="0" cy="0"/>
         </a:xfrm>
       </p:grpSpPr>
+      <p:pic>
+        <p:nvPicPr>
+          <p:cNvPr id="2" name="Picture 1">
+            <a:extLst>
+              <a:ext uri="{FF2B5EF4-FFF2-40B4-BE49-F238E27FC236}">
+                <a16:creationId xmlns:a16="http://schemas.microsoft.com/office/drawing/2014/main" id="{26A6DDDA-4E35-8FCD-6CED-C29485B082CE}"/>
+              </a:ext>
+            </a:extLst>
+          </p:cNvPr>
+          <p:cNvPicPr>
+            <a:picLocks noChangeAspect="1"/>
+          </p:cNvPicPr>
+          <p:nvPr/>
+        </p:nvPicPr>
+        <p:blipFill>
+          <a:blip r:embed="rId2"/>
+          <a:stretch>
+            <a:fillRect/>
+          </a:stretch>
+        </p:blipFill>
+        <p:spPr>
+          <a:xfrm>
+            <a:off x="1526628" y="573072"/>
+            <a:ext cx="7772400" cy="4009180"/>
+          </a:xfrm>
+          <a:prstGeom prst="rect">
+            <a:avLst/>
+          </a:prstGeom>
+        </p:spPr>
+      </p:pic>
+      <p:sp>
+        <p:nvSpPr>
+          <p:cNvPr id="4" name="TextBox 3">
+            <a:extLst>
+              <a:ext uri="{FF2B5EF4-FFF2-40B4-BE49-F238E27FC236}">
+                <a16:creationId xmlns:a16="http://schemas.microsoft.com/office/drawing/2014/main" id="{E9324448-68D1-4CD1-5413-BAE305711CD5}"/>
+              </a:ext>
+            </a:extLst>
+          </p:cNvPr>
+          <p:cNvSpPr txBox="1"/>
+          <p:nvPr/>
+        </p:nvSpPr>
+        <p:spPr>
+          <a:xfrm>
+            <a:off x="3280258" y="5630182"/>
+            <a:ext cx="2447880" cy="369332"/>
+          </a:xfrm>
+          <a:prstGeom prst="rect">
+            <a:avLst/>
+          </a:prstGeom>
+          <a:noFill/>
+        </p:spPr>
+        <p:txBody>
+          <a:bodyPr wrap="square">
+            <a:spAutoFit/>
+          </a:bodyPr>
+          <a:lstStyle/>
+          <a:p>
+            <a:r>
+              <a:rPr lang="en-US" b="0" i="0" dirty="0">
+                <a:solidFill>
+                  <a:srgbClr val="D63384"/>
+                </a:solidFill>
+                <a:effectLst/>
+                <a:latin typeface="Consolas" panose="020B0609020204030204" pitchFamily="49" charset="0"/>
+              </a:rPr>
+              <a:t>sign-up</a:t>
+            </a:r>
+            <a:endParaRPr lang="en-US" dirty="0"/>
+          </a:p>
+        </p:txBody>
+      </p:sp>
     </p:spTree>
     <p:extLst>
       <p:ext uri="{BB962C8B-B14F-4D97-AF65-F5344CB8AC3E}">
@@ -4094,6 +5550,78 @@
           <a:chExt cx="0" cy="0"/>
         </a:xfrm>
       </p:grpSpPr>
+      <p:pic>
+        <p:nvPicPr>
+          <p:cNvPr id="2" name="Picture 1">
+            <a:extLst>
+              <a:ext uri="{FF2B5EF4-FFF2-40B4-BE49-F238E27FC236}">
+                <a16:creationId xmlns:a16="http://schemas.microsoft.com/office/drawing/2014/main" id="{F9C3C669-02B6-631B-726E-A74213954475}"/>
+              </a:ext>
+            </a:extLst>
+          </p:cNvPr>
+          <p:cNvPicPr>
+            <a:picLocks noChangeAspect="1"/>
+          </p:cNvPicPr>
+          <p:nvPr/>
+        </p:nvPicPr>
+        <p:blipFill>
+          <a:blip r:embed="rId2"/>
+          <a:stretch>
+            <a:fillRect/>
+          </a:stretch>
+        </p:blipFill>
+        <p:spPr>
+          <a:xfrm>
+            <a:off x="750140" y="301919"/>
+            <a:ext cx="7772400" cy="2608776"/>
+          </a:xfrm>
+          <a:prstGeom prst="rect">
+            <a:avLst/>
+          </a:prstGeom>
+        </p:spPr>
+      </p:pic>
+      <p:sp>
+        <p:nvSpPr>
+          <p:cNvPr id="4" name="TextBox 3">
+            <a:extLst>
+              <a:ext uri="{FF2B5EF4-FFF2-40B4-BE49-F238E27FC236}">
+                <a16:creationId xmlns:a16="http://schemas.microsoft.com/office/drawing/2014/main" id="{FDCD0B2D-705A-83EB-A5B3-05E32779C7DC}"/>
+              </a:ext>
+            </a:extLst>
+          </p:cNvPr>
+          <p:cNvSpPr txBox="1"/>
+          <p:nvPr/>
+        </p:nvSpPr>
+        <p:spPr>
+          <a:xfrm>
+            <a:off x="3049030" y="3244334"/>
+            <a:ext cx="6098058" cy="369332"/>
+          </a:xfrm>
+          <a:prstGeom prst="rect">
+            <a:avLst/>
+          </a:prstGeom>
+          <a:noFill/>
+        </p:spPr>
+        <p:txBody>
+          <a:bodyPr wrap="square">
+            <a:spAutoFit/>
+          </a:bodyPr>
+          <a:lstStyle/>
+          <a:p>
+            <a:r>
+              <a:rPr lang="en-US" b="0" i="0" dirty="0" err="1">
+                <a:solidFill>
+                  <a:srgbClr val="D63384"/>
+                </a:solidFill>
+                <a:effectLst/>
+                <a:latin typeface="Consolas" panose="020B0609020204030204" pitchFamily="49" charset="0"/>
+              </a:rPr>
+              <a:t>dealer_review</a:t>
+            </a:r>
+            <a:endParaRPr lang="en-US" dirty="0"/>
+          </a:p>
+        </p:txBody>
+      </p:sp>
     </p:spTree>
     <p:extLst>
       <p:ext uri="{BB962C8B-B14F-4D97-AF65-F5344CB8AC3E}">
@@ -4130,6 +5658,78 @@
           <a:chExt cx="0" cy="0"/>
         </a:xfrm>
       </p:grpSpPr>
+      <p:pic>
+        <p:nvPicPr>
+          <p:cNvPr id="2" name="Picture 1">
+            <a:extLst>
+              <a:ext uri="{FF2B5EF4-FFF2-40B4-BE49-F238E27FC236}">
+                <a16:creationId xmlns:a16="http://schemas.microsoft.com/office/drawing/2014/main" id="{A85B3204-4A97-7E48-2DC8-BF3A5B4F4727}"/>
+              </a:ext>
+            </a:extLst>
+          </p:cNvPr>
+          <p:cNvPicPr>
+            <a:picLocks noChangeAspect="1"/>
+          </p:cNvPicPr>
+          <p:nvPr/>
+        </p:nvPicPr>
+        <p:blipFill>
+          <a:blip r:embed="rId2"/>
+          <a:stretch>
+            <a:fillRect/>
+          </a:stretch>
+        </p:blipFill>
+        <p:spPr>
+          <a:xfrm>
+            <a:off x="916781" y="0"/>
+            <a:ext cx="6343487" cy="6858000"/>
+          </a:xfrm>
+          <a:prstGeom prst="rect">
+            <a:avLst/>
+          </a:prstGeom>
+        </p:spPr>
+      </p:pic>
+      <p:sp>
+        <p:nvSpPr>
+          <p:cNvPr id="4" name="TextBox 3">
+            <a:extLst>
+              <a:ext uri="{FF2B5EF4-FFF2-40B4-BE49-F238E27FC236}">
+                <a16:creationId xmlns:a16="http://schemas.microsoft.com/office/drawing/2014/main" id="{BDA14E93-4533-A582-C6F1-5D33A578DB90}"/>
+              </a:ext>
+            </a:extLst>
+          </p:cNvPr>
+          <p:cNvSpPr txBox="1"/>
+          <p:nvPr/>
+        </p:nvSpPr>
+        <p:spPr>
+          <a:xfrm>
+            <a:off x="9186041" y="3059668"/>
+            <a:ext cx="2596055" cy="369332"/>
+          </a:xfrm>
+          <a:prstGeom prst="rect">
+            <a:avLst/>
+          </a:prstGeom>
+          <a:noFill/>
+        </p:spPr>
+        <p:txBody>
+          <a:bodyPr wrap="square">
+            <a:spAutoFit/>
+          </a:bodyPr>
+          <a:lstStyle/>
+          <a:p>
+            <a:r>
+              <a:rPr lang="en-US" b="0" i="0" dirty="0">
+                <a:solidFill>
+                  <a:srgbClr val="D63384"/>
+                </a:solidFill>
+                <a:effectLst/>
+                <a:latin typeface="Consolas" panose="020B0609020204030204" pitchFamily="49" charset="0"/>
+              </a:rPr>
+              <a:t>dealerships</a:t>
+            </a:r>
+            <a:endParaRPr lang="en-US" dirty="0"/>
+          </a:p>
+        </p:txBody>
+      </p:sp>
     </p:spTree>
     <p:extLst>
       <p:ext uri="{BB962C8B-B14F-4D97-AF65-F5344CB8AC3E}">

</xml_diff>